<commit_message>
Added moe images for readme.md
</commit_message>
<xml_diff>
--- a/images/docker_two_machine.pptx
+++ b/images/docker_two_machine.pptx
@@ -3358,51 +3358,6 @@
           <a:chExt cx="0" cy="0"/>
         </a:xfrm>
       </p:grpSpPr>
-      <p:cxnSp>
-        <p:nvCxnSpPr>
-          <p:cNvPr id="22" name="Straight Arrow Connector 21">
-            <a:extLst>
-              <a:ext uri="{FF2B5EF4-FFF2-40B4-BE49-F238E27FC236}">
-                <a16:creationId xmlns:a16="http://schemas.microsoft.com/office/drawing/2014/main" id="{55A10143-2B26-49D8-9D94-BDD0A2B17C56}"/>
-              </a:ext>
-            </a:extLst>
-          </p:cNvPr>
-          <p:cNvCxnSpPr>
-            <a:cxnSpLocks/>
-          </p:cNvCxnSpPr>
-          <p:nvPr/>
-        </p:nvCxnSpPr>
-        <p:spPr>
-          <a:xfrm flipV="1">
-            <a:off x="3673037" y="4106677"/>
-            <a:ext cx="4601564" cy="2845"/>
-          </a:xfrm>
-          <a:prstGeom prst="straightConnector1">
-            <a:avLst/>
-          </a:prstGeom>
-          <a:ln w="9525">
-            <a:solidFill>
-              <a:schemeClr val="bg1"/>
-            </a:solidFill>
-            <a:headEnd type="triangle"/>
-            <a:tailEnd type="triangle"/>
-          </a:ln>
-        </p:spPr>
-        <p:style>
-          <a:lnRef idx="1">
-            <a:schemeClr val="accent1"/>
-          </a:lnRef>
-          <a:fillRef idx="0">
-            <a:schemeClr val="accent1"/>
-          </a:fillRef>
-          <a:effectRef idx="0">
-            <a:schemeClr val="accent1"/>
-          </a:effectRef>
-          <a:fontRef idx="minor">
-            <a:schemeClr val="tx1"/>
-          </a:fontRef>
-        </p:style>
-      </p:cxnSp>
       <p:grpSp>
         <p:nvGrpSpPr>
           <p:cNvPr id="158" name="Group 128">
@@ -3419,7 +3374,7 @@
         </p:nvGrpSpPr>
         <p:grpSpPr bwMode="auto">
           <a:xfrm>
-            <a:off x="3100338" y="4984912"/>
+            <a:off x="3100338" y="4441987"/>
             <a:ext cx="845699" cy="648000"/>
             <a:chOff x="4470" y="3004"/>
             <a:chExt cx="924" cy="708"/>
@@ -5171,7 +5126,7 @@
         </p:nvCxnSpPr>
         <p:spPr>
           <a:xfrm flipV="1">
-            <a:off x="3779460" y="4739492"/>
+            <a:off x="3779460" y="4196567"/>
             <a:ext cx="1522913" cy="252742"/>
           </a:xfrm>
           <a:prstGeom prst="line">
@@ -5273,10 +5228,10 @@
         </p:nvGrpSpPr>
         <p:grpSpPr>
           <a:xfrm>
-            <a:off x="1584960" y="2650088"/>
+            <a:off x="1584960" y="2107163"/>
             <a:ext cx="2629277" cy="276999"/>
             <a:chOff x="1556446" y="365514"/>
-            <a:chExt cx="3889536" cy="409770"/>
+            <a:chExt cx="3889537" cy="409771"/>
           </a:xfrm>
         </p:grpSpPr>
         <p:pic>
@@ -5349,7 +5304,7 @@
                     <a:schemeClr val="bg1"/>
                   </a:solidFill>
                 </a:rPr>
-                <a:t>daemon (manager)</a:t>
+                <a:t>daemon</a:t>
               </a:r>
             </a:p>
           </p:txBody>
@@ -5467,7 +5422,7 @@
         </p:nvGrpSpPr>
         <p:grpSpPr>
           <a:xfrm>
-            <a:off x="8045149" y="3315670"/>
+            <a:off x="8045149" y="2772745"/>
             <a:ext cx="1543719" cy="1199473"/>
             <a:chOff x="3096404" y="2137919"/>
             <a:chExt cx="1543719" cy="1199473"/>
@@ -5727,7 +5682,7 @@
         </p:nvGrpSpPr>
         <p:grpSpPr>
           <a:xfrm>
-            <a:off x="2673094" y="3321085"/>
+            <a:off x="2673094" y="2778160"/>
             <a:ext cx="1541143" cy="1195829"/>
             <a:chOff x="3096404" y="2141563"/>
             <a:chExt cx="1541143" cy="1195829"/>
@@ -6023,8 +5978,8 @@
         </p:nvSpPr>
         <p:spPr>
           <a:xfrm>
-            <a:off x="929639" y="1965959"/>
-            <a:ext cx="10215991" cy="4036703"/>
+            <a:off x="929639" y="1699259"/>
+            <a:ext cx="10215991" cy="3787141"/>
           </a:xfrm>
           <a:prstGeom prst="rect">
             <a:avLst/>
@@ -6082,7 +6037,7 @@
         </p:nvSpPr>
         <p:spPr>
           <a:xfrm>
-            <a:off x="890560" y="1557971"/>
+            <a:off x="890560" y="1291271"/>
             <a:ext cx="2936494" cy="369332"/>
           </a:xfrm>
           <a:prstGeom prst="rect">
@@ -6121,7 +6076,7 @@
         </p:nvSpPr>
         <p:spPr>
           <a:xfrm>
-            <a:off x="1584960" y="3000777"/>
+            <a:off x="1584960" y="2457852"/>
             <a:ext cx="3717413" cy="1751020"/>
           </a:xfrm>
           <a:prstGeom prst="rect">
@@ -6164,102 +6119,6 @@
           </a:p>
         </p:txBody>
       </p:sp>
-      <p:sp>
-        <p:nvSpPr>
-          <p:cNvPr id="51" name="Rectangle 50">
-            <a:extLst>
-              <a:ext uri="{FF2B5EF4-FFF2-40B4-BE49-F238E27FC236}">
-                <a16:creationId xmlns:a16="http://schemas.microsoft.com/office/drawing/2014/main" id="{01DEA1FB-3788-40A1-BCFE-DA903B8FB827}"/>
-              </a:ext>
-            </a:extLst>
-          </p:cNvPr>
-          <p:cNvSpPr/>
-          <p:nvPr/>
-        </p:nvSpPr>
-        <p:spPr>
-          <a:xfrm>
-            <a:off x="1774371" y="3315751"/>
-            <a:ext cx="8617404" cy="1325026"/>
-          </a:xfrm>
-          <a:prstGeom prst="rect">
-            <a:avLst/>
-          </a:prstGeom>
-          <a:noFill/>
-          <a:ln w="12700">
-            <a:solidFill>
-              <a:schemeClr val="bg1"/>
-            </a:solidFill>
-            <a:prstDash val="dash"/>
-          </a:ln>
-        </p:spPr>
-        <p:style>
-          <a:lnRef idx="2">
-            <a:schemeClr val="accent1">
-              <a:shade val="50000"/>
-            </a:schemeClr>
-          </a:lnRef>
-          <a:fillRef idx="1">
-            <a:schemeClr val="accent1"/>
-          </a:fillRef>
-          <a:effectRef idx="0">
-            <a:schemeClr val="accent1"/>
-          </a:effectRef>
-          <a:fontRef idx="minor">
-            <a:schemeClr val="lt1"/>
-          </a:fontRef>
-        </p:style>
-        <p:txBody>
-          <a:bodyPr rtlCol="0" anchor="t" anchorCtr="0"/>
-          <a:lstStyle/>
-          <a:p>
-            <a:pPr algn="ctr"/>
-            <a:endParaRPr lang="en-GB" sz="1200" dirty="0">
-              <a:solidFill>
-                <a:schemeClr val="tx1"/>
-              </a:solidFill>
-            </a:endParaRPr>
-          </a:p>
-        </p:txBody>
-      </p:sp>
-      <p:sp>
-        <p:nvSpPr>
-          <p:cNvPr id="52" name="TextBox 51">
-            <a:extLst>
-              <a:ext uri="{FF2B5EF4-FFF2-40B4-BE49-F238E27FC236}">
-                <a16:creationId xmlns:a16="http://schemas.microsoft.com/office/drawing/2014/main" id="{80410401-E92B-4D5E-8804-9599BE150C89}"/>
-              </a:ext>
-            </a:extLst>
-          </p:cNvPr>
-          <p:cNvSpPr txBox="1"/>
-          <p:nvPr/>
-        </p:nvSpPr>
-        <p:spPr>
-          <a:xfrm>
-            <a:off x="1675501" y="3063464"/>
-            <a:ext cx="2936494" cy="261610"/>
-          </a:xfrm>
-          <a:prstGeom prst="rect">
-            <a:avLst/>
-          </a:prstGeom>
-          <a:noFill/>
-        </p:spPr>
-        <p:txBody>
-          <a:bodyPr wrap="square" rtlCol="0">
-            <a:spAutoFit/>
-          </a:bodyPr>
-          <a:lstStyle/>
-          <a:p>
-            <a:r>
-              <a:rPr lang="en-GB" sz="1100" dirty="0">
-                <a:solidFill>
-                  <a:schemeClr val="bg1"/>
-                </a:solidFill>
-              </a:rPr>
-              <a:t>‘overlay’ network</a:t>
-            </a:r>
-          </a:p>
-        </p:txBody>
-      </p:sp>
       <p:cxnSp>
         <p:nvCxnSpPr>
           <p:cNvPr id="53" name="Straight Connector 52">
@@ -6277,7 +6136,7 @@
         </p:nvCxnSpPr>
         <p:spPr>
           <a:xfrm flipH="1" flipV="1">
-            <a:off x="1584960" y="4751539"/>
+            <a:off x="1584960" y="4208614"/>
             <a:ext cx="1531853" cy="275475"/>
           </a:xfrm>
           <a:prstGeom prst="line">
@@ -6322,7 +6181,7 @@
         </p:nvGrpSpPr>
         <p:grpSpPr bwMode="auto">
           <a:xfrm>
-            <a:off x="8365414" y="4972607"/>
+            <a:off x="8365414" y="4429682"/>
             <a:ext cx="845699" cy="648000"/>
             <a:chOff x="4470" y="3004"/>
             <a:chExt cx="924" cy="708"/>
@@ -8074,7 +7933,7 @@
         </p:nvCxnSpPr>
         <p:spPr>
           <a:xfrm flipV="1">
-            <a:off x="9044536" y="4727187"/>
+            <a:off x="9044536" y="4184262"/>
             <a:ext cx="1522913" cy="252742"/>
           </a:xfrm>
           <a:prstGeom prst="line">
@@ -8119,7 +7978,7 @@
         </p:nvGrpSpPr>
         <p:grpSpPr>
           <a:xfrm>
-            <a:off x="6850036" y="2637783"/>
+            <a:off x="6850036" y="2094858"/>
             <a:ext cx="2183920" cy="276999"/>
             <a:chOff x="1556446" y="365514"/>
             <a:chExt cx="3230711" cy="409770"/>
@@ -8195,7 +8054,7 @@
                     <a:schemeClr val="bg1"/>
                   </a:solidFill>
                 </a:rPr>
-                <a:t>daemon (worker)</a:t>
+                <a:t>daemon</a:t>
               </a:r>
             </a:p>
           </p:txBody>
@@ -8215,7 +8074,7 @@
         </p:nvSpPr>
         <p:spPr>
           <a:xfrm>
-            <a:off x="6850036" y="2988472"/>
+            <a:off x="6850036" y="2445547"/>
             <a:ext cx="3717413" cy="1751020"/>
           </a:xfrm>
           <a:prstGeom prst="rect">
@@ -8275,7 +8134,7 @@
         </p:nvCxnSpPr>
         <p:spPr>
           <a:xfrm flipH="1" flipV="1">
-            <a:off x="6850036" y="4739234"/>
+            <a:off x="6850036" y="4196309"/>
             <a:ext cx="1531853" cy="275475"/>
           </a:xfrm>
           <a:prstGeom prst="line">
@@ -8332,7 +8191,7 @@
         </p:blipFill>
         <p:spPr>
           <a:xfrm>
-            <a:off x="3329921" y="5018441"/>
+            <a:off x="3329921" y="4475516"/>
             <a:ext cx="297316" cy="360000"/>
           </a:xfrm>
           <a:prstGeom prst="rect">
@@ -8368,7 +8227,7 @@
         </p:blipFill>
         <p:spPr>
           <a:xfrm>
-            <a:off x="8576087" y="5006746"/>
+            <a:off x="8576087" y="4463821"/>
             <a:ext cx="297316" cy="360000"/>
           </a:xfrm>
           <a:prstGeom prst="rect">
@@ -8390,7 +8249,7 @@
         </p:nvSpPr>
         <p:spPr>
           <a:xfrm>
-            <a:off x="3917556" y="5163086"/>
+            <a:off x="3917556" y="4620161"/>
             <a:ext cx="900774" cy="400110"/>
           </a:xfrm>
           <a:prstGeom prst="rect">
@@ -8439,7 +8298,7 @@
         </p:nvSpPr>
         <p:spPr>
           <a:xfrm>
-            <a:off x="9190245" y="5212259"/>
+            <a:off x="9190245" y="4669334"/>
             <a:ext cx="900774" cy="400110"/>
           </a:xfrm>
           <a:prstGeom prst="rect">
@@ -8470,6 +8329,534 @@
                 </a:solidFill>
               </a:rPr>
               <a:t>instance</a:t>
+            </a:r>
+          </a:p>
+        </p:txBody>
+      </p:sp>
+      <p:grpSp>
+        <p:nvGrpSpPr>
+          <p:cNvPr id="117" name="Group 116">
+            <a:extLst>
+              <a:ext uri="{FF2B5EF4-FFF2-40B4-BE49-F238E27FC236}">
+                <a16:creationId xmlns:a16="http://schemas.microsoft.com/office/drawing/2014/main" id="{D0EB77FD-A629-4083-9ED0-F0C0D11D2FCB}"/>
+              </a:ext>
+            </a:extLst>
+          </p:cNvPr>
+          <p:cNvGrpSpPr/>
+          <p:nvPr/>
+        </p:nvGrpSpPr>
+        <p:grpSpPr>
+          <a:xfrm>
+            <a:off x="3457791" y="5238750"/>
+            <a:ext cx="91162" cy="427455"/>
+            <a:chOff x="3457791" y="5238750"/>
+            <a:chExt cx="91162" cy="427455"/>
+          </a:xfrm>
+        </p:grpSpPr>
+        <p:cxnSp>
+          <p:nvCxnSpPr>
+            <p:cNvPr id="118" name="Straight Connector 117">
+              <a:extLst>
+                <a:ext uri="{FF2B5EF4-FFF2-40B4-BE49-F238E27FC236}">
+                  <a16:creationId xmlns:a16="http://schemas.microsoft.com/office/drawing/2014/main" id="{61E7AEB3-C43A-4570-B429-D2A048F6F77C}"/>
+                </a:ext>
+              </a:extLst>
+            </p:cNvPr>
+            <p:cNvCxnSpPr>
+              <a:cxnSpLocks/>
+            </p:cNvCxnSpPr>
+            <p:nvPr/>
+          </p:nvCxnSpPr>
+          <p:spPr>
+            <a:xfrm>
+              <a:off x="3548953" y="5238750"/>
+              <a:ext cx="0" cy="427455"/>
+            </a:xfrm>
+            <a:prstGeom prst="line">
+              <a:avLst/>
+            </a:prstGeom>
+            <a:ln w="28575">
+              <a:solidFill>
+                <a:srgbClr val="FFFF00"/>
+              </a:solidFill>
+            </a:ln>
+          </p:spPr>
+          <p:style>
+            <a:lnRef idx="1">
+              <a:schemeClr val="accent1"/>
+            </a:lnRef>
+            <a:fillRef idx="0">
+              <a:schemeClr val="accent1"/>
+            </a:fillRef>
+            <a:effectRef idx="0">
+              <a:schemeClr val="accent1"/>
+            </a:effectRef>
+            <a:fontRef idx="minor">
+              <a:schemeClr val="tx1"/>
+            </a:fontRef>
+          </p:style>
+        </p:cxnSp>
+        <p:cxnSp>
+          <p:nvCxnSpPr>
+            <p:cNvPr id="119" name="Straight Connector 118">
+              <a:extLst>
+                <a:ext uri="{FF2B5EF4-FFF2-40B4-BE49-F238E27FC236}">
+                  <a16:creationId xmlns:a16="http://schemas.microsoft.com/office/drawing/2014/main" id="{A5A19443-C7C5-4C1F-901E-F2A101F5CCC7}"/>
+                </a:ext>
+              </a:extLst>
+            </p:cNvPr>
+            <p:cNvCxnSpPr>
+              <a:cxnSpLocks/>
+            </p:cNvCxnSpPr>
+            <p:nvPr/>
+          </p:nvCxnSpPr>
+          <p:spPr>
+            <a:xfrm>
+              <a:off x="3457791" y="5238750"/>
+              <a:ext cx="0" cy="427455"/>
+            </a:xfrm>
+            <a:prstGeom prst="line">
+              <a:avLst/>
+            </a:prstGeom>
+            <a:ln w="28575">
+              <a:solidFill>
+                <a:srgbClr val="FFFF00"/>
+              </a:solidFill>
+            </a:ln>
+          </p:spPr>
+          <p:style>
+            <a:lnRef idx="1">
+              <a:schemeClr val="accent1"/>
+            </a:lnRef>
+            <a:fillRef idx="0">
+              <a:schemeClr val="accent1"/>
+            </a:fillRef>
+            <a:effectRef idx="0">
+              <a:schemeClr val="accent1"/>
+            </a:effectRef>
+            <a:fontRef idx="minor">
+              <a:schemeClr val="tx1"/>
+            </a:fontRef>
+          </p:style>
+        </p:cxnSp>
+      </p:grpSp>
+      <p:grpSp>
+        <p:nvGrpSpPr>
+          <p:cNvPr id="120" name="Group 119">
+            <a:extLst>
+              <a:ext uri="{FF2B5EF4-FFF2-40B4-BE49-F238E27FC236}">
+                <a16:creationId xmlns:a16="http://schemas.microsoft.com/office/drawing/2014/main" id="{9FD9955D-84B9-4FDF-B944-1349DF555362}"/>
+              </a:ext>
+            </a:extLst>
+          </p:cNvPr>
+          <p:cNvGrpSpPr/>
+          <p:nvPr/>
+        </p:nvGrpSpPr>
+        <p:grpSpPr>
+          <a:xfrm>
+            <a:off x="8724499" y="5238750"/>
+            <a:ext cx="91162" cy="427455"/>
+            <a:chOff x="3457791" y="5238750"/>
+            <a:chExt cx="91162" cy="427455"/>
+          </a:xfrm>
+        </p:grpSpPr>
+        <p:cxnSp>
+          <p:nvCxnSpPr>
+            <p:cNvPr id="121" name="Straight Connector 120">
+              <a:extLst>
+                <a:ext uri="{FF2B5EF4-FFF2-40B4-BE49-F238E27FC236}">
+                  <a16:creationId xmlns:a16="http://schemas.microsoft.com/office/drawing/2014/main" id="{8C62F10E-0AC3-42EA-8162-50DC8DD87D6D}"/>
+                </a:ext>
+              </a:extLst>
+            </p:cNvPr>
+            <p:cNvCxnSpPr>
+              <a:cxnSpLocks/>
+            </p:cNvCxnSpPr>
+            <p:nvPr/>
+          </p:nvCxnSpPr>
+          <p:spPr>
+            <a:xfrm>
+              <a:off x="3548953" y="5238750"/>
+              <a:ext cx="0" cy="427455"/>
+            </a:xfrm>
+            <a:prstGeom prst="line">
+              <a:avLst/>
+            </a:prstGeom>
+            <a:ln w="28575">
+              <a:solidFill>
+                <a:srgbClr val="FFFF00"/>
+              </a:solidFill>
+            </a:ln>
+          </p:spPr>
+          <p:style>
+            <a:lnRef idx="1">
+              <a:schemeClr val="accent1"/>
+            </a:lnRef>
+            <a:fillRef idx="0">
+              <a:schemeClr val="accent1"/>
+            </a:fillRef>
+            <a:effectRef idx="0">
+              <a:schemeClr val="accent1"/>
+            </a:effectRef>
+            <a:fontRef idx="minor">
+              <a:schemeClr val="tx1"/>
+            </a:fontRef>
+          </p:style>
+        </p:cxnSp>
+        <p:cxnSp>
+          <p:nvCxnSpPr>
+            <p:cNvPr id="122" name="Straight Connector 121">
+              <a:extLst>
+                <a:ext uri="{FF2B5EF4-FFF2-40B4-BE49-F238E27FC236}">
+                  <a16:creationId xmlns:a16="http://schemas.microsoft.com/office/drawing/2014/main" id="{11DF34FD-AD0B-4376-ACE5-35C4E0B677F2}"/>
+                </a:ext>
+              </a:extLst>
+            </p:cNvPr>
+            <p:cNvCxnSpPr>
+              <a:cxnSpLocks/>
+            </p:cNvCxnSpPr>
+            <p:nvPr/>
+          </p:nvCxnSpPr>
+          <p:spPr>
+            <a:xfrm>
+              <a:off x="3457791" y="5238750"/>
+              <a:ext cx="0" cy="427455"/>
+            </a:xfrm>
+            <a:prstGeom prst="line">
+              <a:avLst/>
+            </a:prstGeom>
+            <a:ln w="28575">
+              <a:solidFill>
+                <a:srgbClr val="FFFF00"/>
+              </a:solidFill>
+            </a:ln>
+          </p:spPr>
+          <p:style>
+            <a:lnRef idx="1">
+              <a:schemeClr val="accent1"/>
+            </a:lnRef>
+            <a:fillRef idx="0">
+              <a:schemeClr val="accent1"/>
+            </a:fillRef>
+            <a:effectRef idx="0">
+              <a:schemeClr val="accent1"/>
+            </a:effectRef>
+            <a:fontRef idx="minor">
+              <a:schemeClr val="tx1"/>
+            </a:fontRef>
+          </p:style>
+        </p:cxnSp>
+      </p:grpSp>
+      <p:sp>
+        <p:nvSpPr>
+          <p:cNvPr id="123" name="TextBox 122">
+            <a:extLst>
+              <a:ext uri="{FF2B5EF4-FFF2-40B4-BE49-F238E27FC236}">
+                <a16:creationId xmlns:a16="http://schemas.microsoft.com/office/drawing/2014/main" id="{36BFCB09-7F03-4FDD-9F71-254DB7B3F9D5}"/>
+              </a:ext>
+            </a:extLst>
+          </p:cNvPr>
+          <p:cNvSpPr txBox="1"/>
+          <p:nvPr/>
+        </p:nvSpPr>
+        <p:spPr>
+          <a:xfrm>
+            <a:off x="3521043" y="5200738"/>
+            <a:ext cx="900774" cy="276999"/>
+          </a:xfrm>
+          <a:prstGeom prst="rect">
+            <a:avLst/>
+          </a:prstGeom>
+          <a:noFill/>
+        </p:spPr>
+        <p:txBody>
+          <a:bodyPr wrap="square" rtlCol="0">
+            <a:spAutoFit/>
+          </a:bodyPr>
+          <a:lstStyle/>
+          <a:p>
+            <a:r>
+              <a:rPr lang="en-GB" sz="1200" dirty="0">
+                <a:solidFill>
+                  <a:srgbClr val="FFFF00"/>
+                </a:solidFill>
+              </a:rPr>
+              <a:t>port</a:t>
+            </a:r>
+          </a:p>
+        </p:txBody>
+      </p:sp>
+      <p:sp>
+        <p:nvSpPr>
+          <p:cNvPr id="124" name="TextBox 123">
+            <a:extLst>
+              <a:ext uri="{FF2B5EF4-FFF2-40B4-BE49-F238E27FC236}">
+                <a16:creationId xmlns:a16="http://schemas.microsoft.com/office/drawing/2014/main" id="{72E0FD44-7006-469A-A950-5AB7E28B5661}"/>
+              </a:ext>
+            </a:extLst>
+          </p:cNvPr>
+          <p:cNvSpPr txBox="1"/>
+          <p:nvPr/>
+        </p:nvSpPr>
+        <p:spPr>
+          <a:xfrm>
+            <a:off x="8755314" y="5214274"/>
+            <a:ext cx="900774" cy="276999"/>
+          </a:xfrm>
+          <a:prstGeom prst="rect">
+            <a:avLst/>
+          </a:prstGeom>
+          <a:noFill/>
+        </p:spPr>
+        <p:txBody>
+          <a:bodyPr wrap="square" rtlCol="0">
+            <a:spAutoFit/>
+          </a:bodyPr>
+          <a:lstStyle/>
+          <a:p>
+            <a:r>
+              <a:rPr lang="en-GB" sz="1200" dirty="0">
+                <a:solidFill>
+                  <a:srgbClr val="FFFF00"/>
+                </a:solidFill>
+              </a:rPr>
+              <a:t>port</a:t>
+            </a:r>
+          </a:p>
+        </p:txBody>
+      </p:sp>
+      <p:sp>
+        <p:nvSpPr>
+          <p:cNvPr id="125" name="Arc 124">
+            <a:extLst>
+              <a:ext uri="{FF2B5EF4-FFF2-40B4-BE49-F238E27FC236}">
+                <a16:creationId xmlns:a16="http://schemas.microsoft.com/office/drawing/2014/main" id="{A5D7C6F6-16BA-4059-83ED-F2AB7A58B332}"/>
+              </a:ext>
+            </a:extLst>
+          </p:cNvPr>
+          <p:cNvSpPr/>
+          <p:nvPr/>
+        </p:nvSpPr>
+        <p:spPr>
+          <a:xfrm rot="10800000">
+            <a:off x="3536253" y="5594399"/>
+            <a:ext cx="5266708" cy="329315"/>
+          </a:xfrm>
+          <a:prstGeom prst="arc">
+            <a:avLst>
+              <a:gd name="adj1" fmla="val 10800809"/>
+              <a:gd name="adj2" fmla="val 0"/>
+            </a:avLst>
+          </a:prstGeom>
+          <a:ln w="19050">
+            <a:solidFill>
+              <a:srgbClr val="00B050"/>
+            </a:solidFill>
+            <a:prstDash val="lgDashDot"/>
+            <a:headEnd type="none" w="med" len="med"/>
+            <a:tailEnd type="stealth" w="lg" len="lg"/>
+          </a:ln>
+        </p:spPr>
+        <p:style>
+          <a:lnRef idx="1">
+            <a:schemeClr val="accent1"/>
+          </a:lnRef>
+          <a:fillRef idx="0">
+            <a:schemeClr val="accent1"/>
+          </a:fillRef>
+          <a:effectRef idx="0">
+            <a:schemeClr val="accent1"/>
+          </a:effectRef>
+          <a:fontRef idx="minor">
+            <a:schemeClr val="tx1"/>
+          </a:fontRef>
+        </p:style>
+        <p:txBody>
+          <a:bodyPr rtlCol="0" anchor="ctr"/>
+          <a:lstStyle/>
+          <a:p>
+            <a:pPr algn="ctr"/>
+            <a:endParaRPr lang="en-GB"/>
+          </a:p>
+        </p:txBody>
+      </p:sp>
+      <p:sp>
+        <p:nvSpPr>
+          <p:cNvPr id="126" name="TextBox 125">
+            <a:extLst>
+              <a:ext uri="{FF2B5EF4-FFF2-40B4-BE49-F238E27FC236}">
+                <a16:creationId xmlns:a16="http://schemas.microsoft.com/office/drawing/2014/main" id="{50721D47-EB18-4EEB-9CA4-AC24F789BEA5}"/>
+              </a:ext>
+            </a:extLst>
+          </p:cNvPr>
+          <p:cNvSpPr txBox="1"/>
+          <p:nvPr/>
+        </p:nvSpPr>
+        <p:spPr>
+          <a:xfrm>
+            <a:off x="4105066" y="5574291"/>
+            <a:ext cx="4027587" cy="292388"/>
+          </a:xfrm>
+          <a:prstGeom prst="rect">
+            <a:avLst/>
+          </a:prstGeom>
+          <a:noFill/>
+        </p:spPr>
+        <p:txBody>
+          <a:bodyPr wrap="square" rtlCol="0">
+            <a:spAutoFit/>
+          </a:bodyPr>
+          <a:lstStyle/>
+          <a:p>
+            <a:pPr algn="ctr"/>
+            <a:r>
+              <a:rPr lang="en-GB" sz="1300" dirty="0">
+                <a:solidFill>
+                  <a:srgbClr val="00B050"/>
+                </a:solidFill>
+              </a:rPr>
+              <a:t>use ec2 instance subnet address and port to join swarm</a:t>
+            </a:r>
+          </a:p>
+        </p:txBody>
+      </p:sp>
+      <p:cxnSp>
+        <p:nvCxnSpPr>
+          <p:cNvPr id="127" name="Straight Arrow Connector 126">
+            <a:extLst>
+              <a:ext uri="{FF2B5EF4-FFF2-40B4-BE49-F238E27FC236}">
+                <a16:creationId xmlns:a16="http://schemas.microsoft.com/office/drawing/2014/main" id="{2BEFA7A4-AE65-4460-B8FB-AC48A7D1C81B}"/>
+              </a:ext>
+            </a:extLst>
+          </p:cNvPr>
+          <p:cNvCxnSpPr>
+            <a:cxnSpLocks/>
+          </p:cNvCxnSpPr>
+          <p:nvPr/>
+        </p:nvCxnSpPr>
+        <p:spPr>
+          <a:xfrm flipV="1">
+            <a:off x="3673037" y="3563752"/>
+            <a:ext cx="4601564" cy="2845"/>
+          </a:xfrm>
+          <a:prstGeom prst="straightConnector1">
+            <a:avLst/>
+          </a:prstGeom>
+          <a:ln w="9525">
+            <a:solidFill>
+              <a:schemeClr val="bg1"/>
+            </a:solidFill>
+            <a:headEnd type="triangle"/>
+            <a:tailEnd type="triangle"/>
+          </a:ln>
+        </p:spPr>
+        <p:style>
+          <a:lnRef idx="1">
+            <a:schemeClr val="accent1"/>
+          </a:lnRef>
+          <a:fillRef idx="0">
+            <a:schemeClr val="accent1"/>
+          </a:fillRef>
+          <a:effectRef idx="0">
+            <a:schemeClr val="accent1"/>
+          </a:effectRef>
+          <a:fontRef idx="minor">
+            <a:schemeClr val="tx1"/>
+          </a:fontRef>
+        </p:style>
+      </p:cxnSp>
+      <p:sp>
+        <p:nvSpPr>
+          <p:cNvPr id="128" name="Rectangle 127">
+            <a:extLst>
+              <a:ext uri="{FF2B5EF4-FFF2-40B4-BE49-F238E27FC236}">
+                <a16:creationId xmlns:a16="http://schemas.microsoft.com/office/drawing/2014/main" id="{BDA7E76B-9A66-4838-8191-F7D182CA96C5}"/>
+              </a:ext>
+            </a:extLst>
+          </p:cNvPr>
+          <p:cNvSpPr/>
+          <p:nvPr/>
+        </p:nvSpPr>
+        <p:spPr>
+          <a:xfrm>
+            <a:off x="1774371" y="2772826"/>
+            <a:ext cx="8617404" cy="1325026"/>
+          </a:xfrm>
+          <a:prstGeom prst="rect">
+            <a:avLst/>
+          </a:prstGeom>
+          <a:noFill/>
+          <a:ln w="12700">
+            <a:solidFill>
+              <a:schemeClr val="bg1"/>
+            </a:solidFill>
+            <a:prstDash val="dash"/>
+          </a:ln>
+        </p:spPr>
+        <p:style>
+          <a:lnRef idx="2">
+            <a:schemeClr val="accent1">
+              <a:shade val="50000"/>
+            </a:schemeClr>
+          </a:lnRef>
+          <a:fillRef idx="1">
+            <a:schemeClr val="accent1"/>
+          </a:fillRef>
+          <a:effectRef idx="0">
+            <a:schemeClr val="accent1"/>
+          </a:effectRef>
+          <a:fontRef idx="minor">
+            <a:schemeClr val="lt1"/>
+          </a:fontRef>
+        </p:style>
+        <p:txBody>
+          <a:bodyPr rtlCol="0" anchor="t" anchorCtr="0"/>
+          <a:lstStyle/>
+          <a:p>
+            <a:pPr algn="ctr"/>
+            <a:endParaRPr lang="en-GB" sz="1200" dirty="0">
+              <a:solidFill>
+                <a:schemeClr val="tx1"/>
+              </a:solidFill>
+            </a:endParaRPr>
+          </a:p>
+        </p:txBody>
+      </p:sp>
+      <p:sp>
+        <p:nvSpPr>
+          <p:cNvPr id="129" name="TextBox 128">
+            <a:extLst>
+              <a:ext uri="{FF2B5EF4-FFF2-40B4-BE49-F238E27FC236}">
+                <a16:creationId xmlns:a16="http://schemas.microsoft.com/office/drawing/2014/main" id="{6055C813-05D4-4E9B-A5E3-058AFAFE2131}"/>
+              </a:ext>
+            </a:extLst>
+          </p:cNvPr>
+          <p:cNvSpPr txBox="1"/>
+          <p:nvPr/>
+        </p:nvSpPr>
+        <p:spPr>
+          <a:xfrm>
+            <a:off x="1675501" y="2520539"/>
+            <a:ext cx="2936494" cy="261610"/>
+          </a:xfrm>
+          <a:prstGeom prst="rect">
+            <a:avLst/>
+          </a:prstGeom>
+          <a:noFill/>
+        </p:spPr>
+        <p:txBody>
+          <a:bodyPr wrap="square" rtlCol="0">
+            <a:spAutoFit/>
+          </a:bodyPr>
+          <a:lstStyle/>
+          <a:p>
+            <a:r>
+              <a:rPr lang="en-GB" sz="1100" dirty="0">
+                <a:solidFill>
+                  <a:schemeClr val="bg1"/>
+                </a:solidFill>
+              </a:rPr>
+              <a:t>‘overlay’ network</a:t>
             </a:r>
           </a:p>
         </p:txBody>

</xml_diff>

<commit_message>
Updated architecture diagrams with IP addresses of network and subnetwork
</commit_message>
<xml_diff>
--- a/images/docker_two_machine.pptx
+++ b/images/docker_two_machine.pptx
@@ -5384,7 +5384,7 @@
         <p:spPr>
           <a:xfrm>
             <a:off x="734251" y="917757"/>
-            <a:ext cx="2936494" cy="369332"/>
+            <a:ext cx="4568122" cy="369332"/>
           </a:xfrm>
           <a:prstGeom prst="rect">
             <a:avLst/>
@@ -5403,7 +5403,7 @@
                   <a:schemeClr val="bg1"/>
                 </a:solidFill>
               </a:rPr>
-              <a:t>Virtual private cloud (VPC)</a:t>
+              <a:t>Virtual private cloud (VPC) (172.31.0.0/16)</a:t>
             </a:r>
           </a:p>
         </p:txBody>
@@ -6057,7 +6057,7 @@
                   <a:schemeClr val="bg1"/>
                 </a:solidFill>
               </a:rPr>
-              <a:t>Subnet</a:t>
+              <a:t>Subnet (172.31.16.0/20)</a:t>
             </a:r>
           </a:p>
         </p:txBody>
@@ -8694,8 +8694,8 @@
         </p:nvSpPr>
         <p:spPr>
           <a:xfrm>
-            <a:off x="4105066" y="5574291"/>
-            <a:ext cx="4027587" cy="292388"/>
+            <a:off x="3937039" y="5574291"/>
+            <a:ext cx="4337793" cy="292388"/>
           </a:xfrm>
           <a:prstGeom prst="rect">
             <a:avLst/>
@@ -8715,17 +8715,56 @@
                   <a:srgbClr val="00B050"/>
                 </a:solidFill>
               </a:rPr>
-              <a:t>use ec2 instance subnet address and port to join swarm</a:t>
+              <a:t>use ec2 instance VPC IP address and port 2377 to join swarm</a:t>
+            </a:r>
+          </a:p>
+        </p:txBody>
+      </p:sp>
+      <p:sp>
+        <p:nvSpPr>
+          <p:cNvPr id="129" name="TextBox 128">
+            <a:extLst>
+              <a:ext uri="{FF2B5EF4-FFF2-40B4-BE49-F238E27FC236}">
+                <a16:creationId xmlns:a16="http://schemas.microsoft.com/office/drawing/2014/main" id="{6055C813-05D4-4E9B-A5E3-058AFAFE2131}"/>
+              </a:ext>
+            </a:extLst>
+          </p:cNvPr>
+          <p:cNvSpPr txBox="1"/>
+          <p:nvPr/>
+        </p:nvSpPr>
+        <p:spPr>
+          <a:xfrm>
+            <a:off x="1675501" y="2520539"/>
+            <a:ext cx="2936494" cy="261610"/>
+          </a:xfrm>
+          <a:prstGeom prst="rect">
+            <a:avLst/>
+          </a:prstGeom>
+          <a:noFill/>
+        </p:spPr>
+        <p:txBody>
+          <a:bodyPr wrap="square" rtlCol="0">
+            <a:spAutoFit/>
+          </a:bodyPr>
+          <a:lstStyle/>
+          <a:p>
+            <a:r>
+              <a:rPr lang="en-GB" sz="1100" dirty="0">
+                <a:solidFill>
+                  <a:schemeClr val="bg1"/>
+                </a:solidFill>
+              </a:rPr>
+              <a:t>‘overlay’ network</a:t>
             </a:r>
           </a:p>
         </p:txBody>
       </p:sp>
       <p:cxnSp>
         <p:nvCxnSpPr>
-          <p:cNvPr id="127" name="Straight Arrow Connector 126">
-            <a:extLst>
-              <a:ext uri="{FF2B5EF4-FFF2-40B4-BE49-F238E27FC236}">
-                <a16:creationId xmlns:a16="http://schemas.microsoft.com/office/drawing/2014/main" id="{2BEFA7A4-AE65-4460-B8FB-AC48A7D1C81B}"/>
+          <p:cNvPr id="130" name="Straight Arrow Connector 129">
+            <a:extLst>
+              <a:ext uri="{FF2B5EF4-FFF2-40B4-BE49-F238E27FC236}">
+                <a16:creationId xmlns:a16="http://schemas.microsoft.com/office/drawing/2014/main" id="{82440DEC-2972-4AEB-903F-5CCE99BDC729}"/>
               </a:ext>
             </a:extLst>
           </p:cNvPr>
@@ -8767,10 +8806,10 @@
       </p:cxnSp>
       <p:sp>
         <p:nvSpPr>
-          <p:cNvPr id="128" name="Rectangle 127">
-            <a:extLst>
-              <a:ext uri="{FF2B5EF4-FFF2-40B4-BE49-F238E27FC236}">
-                <a16:creationId xmlns:a16="http://schemas.microsoft.com/office/drawing/2014/main" id="{BDA7E76B-9A66-4838-8191-F7D182CA96C5}"/>
+          <p:cNvPr id="131" name="Rectangle 130">
+            <a:extLst>
+              <a:ext uri="{FF2B5EF4-FFF2-40B4-BE49-F238E27FC236}">
+                <a16:creationId xmlns:a16="http://schemas.microsoft.com/office/drawing/2014/main" id="{F73104CE-B74F-4FD3-B27C-C8AF2D87D699}"/>
               </a:ext>
             </a:extLst>
           </p:cNvPr>
@@ -8819,45 +8858,6 @@
                 <a:schemeClr val="tx1"/>
               </a:solidFill>
             </a:endParaRPr>
-          </a:p>
-        </p:txBody>
-      </p:sp>
-      <p:sp>
-        <p:nvSpPr>
-          <p:cNvPr id="129" name="TextBox 128">
-            <a:extLst>
-              <a:ext uri="{FF2B5EF4-FFF2-40B4-BE49-F238E27FC236}">
-                <a16:creationId xmlns:a16="http://schemas.microsoft.com/office/drawing/2014/main" id="{6055C813-05D4-4E9B-A5E3-058AFAFE2131}"/>
-              </a:ext>
-            </a:extLst>
-          </p:cNvPr>
-          <p:cNvSpPr txBox="1"/>
-          <p:nvPr/>
-        </p:nvSpPr>
-        <p:spPr>
-          <a:xfrm>
-            <a:off x="1675501" y="2520539"/>
-            <a:ext cx="2936494" cy="261610"/>
-          </a:xfrm>
-          <a:prstGeom prst="rect">
-            <a:avLst/>
-          </a:prstGeom>
-          <a:noFill/>
-        </p:spPr>
-        <p:txBody>
-          <a:bodyPr wrap="square" rtlCol="0">
-            <a:spAutoFit/>
-          </a:bodyPr>
-          <a:lstStyle/>
-          <a:p>
-            <a:r>
-              <a:rPr lang="en-GB" sz="1100" dirty="0">
-                <a:solidFill>
-                  <a:schemeClr val="bg1"/>
-                </a:solidFill>
-              </a:rPr>
-              <a:t>‘overlay’ network</a:t>
-            </a:r>
           </a:p>
         </p:txBody>
       </p:sp>

</xml_diff>

<commit_message>
fix for docker-compose.yml format to proper identify replicas
</commit_message>
<xml_diff>
--- a/images/docker_two_machine.pptx
+++ b/images/docker_two_machine.pptx
@@ -267,7 +267,7 @@
           <a:p>
             <a:fld id="{3C5B2E8D-3EEE-4538-9B9D-16FC815DA76B}" type="datetimeFigureOut">
               <a:rPr lang="en-GB" smtClean="0"/>
-              <a:t>25/04/2020</a:t>
+              <a:t>07/05/2020</a:t>
             </a:fld>
             <a:endParaRPr lang="en-GB"/>
           </a:p>
@@ -467,7 +467,7 @@
           <a:p>
             <a:fld id="{3C5B2E8D-3EEE-4538-9B9D-16FC815DA76B}" type="datetimeFigureOut">
               <a:rPr lang="en-GB" smtClean="0"/>
-              <a:t>25/04/2020</a:t>
+              <a:t>07/05/2020</a:t>
             </a:fld>
             <a:endParaRPr lang="en-GB"/>
           </a:p>
@@ -677,7 +677,7 @@
           <a:p>
             <a:fld id="{3C5B2E8D-3EEE-4538-9B9D-16FC815DA76B}" type="datetimeFigureOut">
               <a:rPr lang="en-GB" smtClean="0"/>
-              <a:t>25/04/2020</a:t>
+              <a:t>07/05/2020</a:t>
             </a:fld>
             <a:endParaRPr lang="en-GB"/>
           </a:p>
@@ -877,7 +877,7 @@
           <a:p>
             <a:fld id="{3C5B2E8D-3EEE-4538-9B9D-16FC815DA76B}" type="datetimeFigureOut">
               <a:rPr lang="en-GB" smtClean="0"/>
-              <a:t>25/04/2020</a:t>
+              <a:t>07/05/2020</a:t>
             </a:fld>
             <a:endParaRPr lang="en-GB"/>
           </a:p>
@@ -1153,7 +1153,7 @@
           <a:p>
             <a:fld id="{3C5B2E8D-3EEE-4538-9B9D-16FC815DA76B}" type="datetimeFigureOut">
               <a:rPr lang="en-GB" smtClean="0"/>
-              <a:t>25/04/2020</a:t>
+              <a:t>07/05/2020</a:t>
             </a:fld>
             <a:endParaRPr lang="en-GB"/>
           </a:p>
@@ -1421,7 +1421,7 @@
           <a:p>
             <a:fld id="{3C5B2E8D-3EEE-4538-9B9D-16FC815DA76B}" type="datetimeFigureOut">
               <a:rPr lang="en-GB" smtClean="0"/>
-              <a:t>25/04/2020</a:t>
+              <a:t>07/05/2020</a:t>
             </a:fld>
             <a:endParaRPr lang="en-GB"/>
           </a:p>
@@ -1836,7 +1836,7 @@
           <a:p>
             <a:fld id="{3C5B2E8D-3EEE-4538-9B9D-16FC815DA76B}" type="datetimeFigureOut">
               <a:rPr lang="en-GB" smtClean="0"/>
-              <a:t>25/04/2020</a:t>
+              <a:t>07/05/2020</a:t>
             </a:fld>
             <a:endParaRPr lang="en-GB"/>
           </a:p>
@@ -1978,7 +1978,7 @@
           <a:p>
             <a:fld id="{3C5B2E8D-3EEE-4538-9B9D-16FC815DA76B}" type="datetimeFigureOut">
               <a:rPr lang="en-GB" smtClean="0"/>
-              <a:t>25/04/2020</a:t>
+              <a:t>07/05/2020</a:t>
             </a:fld>
             <a:endParaRPr lang="en-GB"/>
           </a:p>
@@ -2091,7 +2091,7 @@
           <a:p>
             <a:fld id="{3C5B2E8D-3EEE-4538-9B9D-16FC815DA76B}" type="datetimeFigureOut">
               <a:rPr lang="en-GB" smtClean="0"/>
-              <a:t>25/04/2020</a:t>
+              <a:t>07/05/2020</a:t>
             </a:fld>
             <a:endParaRPr lang="en-GB"/>
           </a:p>
@@ -2404,7 +2404,7 @@
           <a:p>
             <a:fld id="{3C5B2E8D-3EEE-4538-9B9D-16FC815DA76B}" type="datetimeFigureOut">
               <a:rPr lang="en-GB" smtClean="0"/>
-              <a:t>25/04/2020</a:t>
+              <a:t>07/05/2020</a:t>
             </a:fld>
             <a:endParaRPr lang="en-GB"/>
           </a:p>
@@ -2693,7 +2693,7 @@
           <a:p>
             <a:fld id="{3C5B2E8D-3EEE-4538-9B9D-16FC815DA76B}" type="datetimeFigureOut">
               <a:rPr lang="en-GB" smtClean="0"/>
-              <a:t>25/04/2020</a:t>
+              <a:t>07/05/2020</a:t>
             </a:fld>
             <a:endParaRPr lang="en-GB"/>
           </a:p>
@@ -2936,7 +2936,7 @@
           <a:p>
             <a:fld id="{3C5B2E8D-3EEE-4538-9B9D-16FC815DA76B}" type="datetimeFigureOut">
               <a:rPr lang="en-GB" smtClean="0"/>
-              <a:t>25/04/2020</a:t>
+              <a:t>07/05/2020</a:t>
             </a:fld>
             <a:endParaRPr lang="en-GB"/>
           </a:p>
@@ -3673,10 +3673,10 @@
         </p:nvGrpSpPr>
         <p:grpSpPr>
           <a:xfrm>
-            <a:off x="4047018" y="1852829"/>
-            <a:ext cx="2243291" cy="1953690"/>
-            <a:chOff x="6850036" y="2094858"/>
-            <a:chExt cx="3717413" cy="3237507"/>
+            <a:off x="4047018" y="1783818"/>
+            <a:ext cx="2243291" cy="2022698"/>
+            <a:chOff x="6850036" y="1980503"/>
+            <a:chExt cx="3717413" cy="3351862"/>
           </a:xfrm>
         </p:grpSpPr>
         <p:grpSp>
@@ -5692,10 +5692,10 @@
           </p:nvGrpSpPr>
           <p:grpSpPr>
             <a:xfrm>
-              <a:off x="6850036" y="2094858"/>
-              <a:ext cx="2183920" cy="276999"/>
-              <a:chOff x="1556446" y="365514"/>
-              <a:chExt cx="3230711" cy="409770"/>
+              <a:off x="6850036" y="1980503"/>
+              <a:ext cx="2183920" cy="333374"/>
+              <a:chOff x="1556446" y="196346"/>
+              <a:chExt cx="3230711" cy="493168"/>
             </a:xfrm>
           </p:grpSpPr>
           <p:pic>
@@ -5748,8 +5748,8 @@
             </p:nvSpPr>
             <p:spPr>
               <a:xfrm>
-                <a:off x="2809187" y="365514"/>
-                <a:ext cx="1977970" cy="409770"/>
+                <a:off x="2809187" y="196346"/>
+                <a:ext cx="1977970" cy="409771"/>
               </a:xfrm>
               <a:prstGeom prst="rect">
                 <a:avLst/>
@@ -6075,10 +6075,10 @@
         </p:nvGrpSpPr>
         <p:grpSpPr>
           <a:xfrm>
-            <a:off x="902492" y="1852829"/>
-            <a:ext cx="2243291" cy="1953690"/>
-            <a:chOff x="6850036" y="2094858"/>
-            <a:chExt cx="3717413" cy="3237507"/>
+            <a:off x="902492" y="1792445"/>
+            <a:ext cx="2243291" cy="2014072"/>
+            <a:chOff x="6850036" y="1994798"/>
+            <a:chExt cx="3717413" cy="3337567"/>
           </a:xfrm>
         </p:grpSpPr>
         <p:grpSp>
@@ -8094,10 +8094,10 @@
           </p:nvGrpSpPr>
           <p:grpSpPr>
             <a:xfrm>
-              <a:off x="6850036" y="2094858"/>
-              <a:ext cx="2183920" cy="276999"/>
-              <a:chOff x="1556446" y="365514"/>
-              <a:chExt cx="3230711" cy="409770"/>
+              <a:off x="6850036" y="1994798"/>
+              <a:ext cx="2183920" cy="319080"/>
+              <a:chOff x="1556446" y="217492"/>
+              <a:chExt cx="3230711" cy="472022"/>
             </a:xfrm>
           </p:grpSpPr>
           <p:pic>
@@ -8150,8 +8150,8 @@
             </p:nvSpPr>
             <p:spPr>
               <a:xfrm>
-                <a:off x="2809187" y="365514"/>
-                <a:ext cx="1977970" cy="409770"/>
+                <a:off x="2809187" y="217492"/>
+                <a:ext cx="1977970" cy="409771"/>
               </a:xfrm>
               <a:prstGeom prst="rect">
                 <a:avLst/>
@@ -8381,10 +8381,10 @@
         </p:nvGrpSpPr>
         <p:grpSpPr>
           <a:xfrm>
-            <a:off x="6945772" y="1825148"/>
-            <a:ext cx="2243291" cy="1953690"/>
-            <a:chOff x="6850036" y="2094858"/>
-            <a:chExt cx="3717413" cy="3237507"/>
+            <a:off x="6945772" y="1756137"/>
+            <a:ext cx="2243291" cy="2022698"/>
+            <a:chOff x="6850036" y="1980503"/>
+            <a:chExt cx="3717413" cy="3351862"/>
           </a:xfrm>
         </p:grpSpPr>
         <p:grpSp>
@@ -10400,10 +10400,10 @@
           </p:nvGrpSpPr>
           <p:grpSpPr>
             <a:xfrm>
-              <a:off x="6850036" y="2094858"/>
-              <a:ext cx="2183920" cy="276999"/>
-              <a:chOff x="1556446" y="365514"/>
-              <a:chExt cx="3230711" cy="409770"/>
+              <a:off x="6850036" y="1980503"/>
+              <a:ext cx="2183920" cy="333374"/>
+              <a:chOff x="1556446" y="196346"/>
+              <a:chExt cx="3230711" cy="493168"/>
             </a:xfrm>
           </p:grpSpPr>
           <p:pic>
@@ -10456,7 +10456,7 @@
             </p:nvSpPr>
             <p:spPr>
               <a:xfrm>
-                <a:off x="2809187" y="365514"/>
+                <a:off x="2809187" y="196346"/>
                 <a:ext cx="1977970" cy="409770"/>
               </a:xfrm>
               <a:prstGeom prst="rect">
@@ -10685,10 +10685,10 @@
         </p:nvGrpSpPr>
         <p:grpSpPr>
           <a:xfrm>
-            <a:off x="853440" y="3788884"/>
-            <a:ext cx="2243291" cy="1923413"/>
-            <a:chOff x="853440" y="3788884"/>
-            <a:chExt cx="2243291" cy="1923413"/>
+            <a:off x="853440" y="3736304"/>
+            <a:ext cx="2243291" cy="1975993"/>
+            <a:chOff x="853440" y="3736304"/>
+            <a:chExt cx="2243291" cy="1975993"/>
           </a:xfrm>
         </p:grpSpPr>
         <p:grpSp>
@@ -12504,10 +12504,10 @@
           </p:nvGrpSpPr>
           <p:grpSpPr>
             <a:xfrm>
-              <a:off x="853440" y="3788884"/>
-              <a:ext cx="1586650" cy="167156"/>
-              <a:chOff x="1556446" y="365514"/>
-              <a:chExt cx="3889537" cy="409771"/>
+              <a:off x="853440" y="3736304"/>
+              <a:ext cx="1586650" cy="184748"/>
+              <a:chOff x="1556446" y="236618"/>
+              <a:chExt cx="3889537" cy="452896"/>
             </a:xfrm>
           </p:grpSpPr>
           <p:pic>
@@ -12560,8 +12560,8 @@
             </p:nvSpPr>
             <p:spPr>
               <a:xfrm>
-                <a:off x="2809187" y="365514"/>
-                <a:ext cx="2636795" cy="409770"/>
+                <a:off x="2809188" y="236618"/>
+                <a:ext cx="2636795" cy="409771"/>
               </a:xfrm>
               <a:prstGeom prst="rect">
                 <a:avLst/>
@@ -13021,10 +13021,10 @@
         </p:nvGrpSpPr>
         <p:grpSpPr>
           <a:xfrm>
-            <a:off x="6703032" y="3788884"/>
-            <a:ext cx="2243291" cy="1923413"/>
-            <a:chOff x="853440" y="3788884"/>
-            <a:chExt cx="2243291" cy="1923413"/>
+            <a:off x="6703032" y="3728502"/>
+            <a:ext cx="2243291" cy="1983795"/>
+            <a:chOff x="853440" y="3728502"/>
+            <a:chExt cx="2243291" cy="1983795"/>
           </a:xfrm>
         </p:grpSpPr>
         <p:grpSp>
@@ -14840,10 +14840,10 @@
           </p:nvGrpSpPr>
           <p:grpSpPr>
             <a:xfrm>
-              <a:off x="853440" y="3788884"/>
-              <a:ext cx="1586650" cy="167156"/>
-              <a:chOff x="1556446" y="365514"/>
-              <a:chExt cx="3889537" cy="409771"/>
+              <a:off x="853440" y="3728502"/>
+              <a:ext cx="1586650" cy="192550"/>
+              <a:chOff x="1556446" y="217492"/>
+              <a:chExt cx="3889537" cy="472022"/>
             </a:xfrm>
           </p:grpSpPr>
           <p:pic>
@@ -14896,8 +14896,8 @@
             </p:nvSpPr>
             <p:spPr>
               <a:xfrm>
-                <a:off x="2809187" y="365514"/>
-                <a:ext cx="2636795" cy="409770"/>
+                <a:off x="2809188" y="217492"/>
+                <a:ext cx="2636795" cy="409771"/>
               </a:xfrm>
               <a:prstGeom prst="rect">
                 <a:avLst/>
@@ -16639,7 +16639,202 @@
                   <a:schemeClr val="accent6"/>
                 </a:solidFill>
               </a:rPr>
-              <a:t>= docker containers’ port</a:t>
+              <a:t>= docker container’s port</a:t>
+            </a:r>
+          </a:p>
+        </p:txBody>
+      </p:sp>
+      <p:sp>
+        <p:nvSpPr>
+          <p:cNvPr id="156" name="TextBox 155">
+            <a:extLst>
+              <a:ext uri="{FF2B5EF4-FFF2-40B4-BE49-F238E27FC236}">
+                <a16:creationId xmlns:a16="http://schemas.microsoft.com/office/drawing/2014/main" id="{40A6618D-1616-0342-BF59-6F56FC4523FD}"/>
+              </a:ext>
+            </a:extLst>
+          </p:cNvPr>
+          <p:cNvSpPr txBox="1"/>
+          <p:nvPr/>
+        </p:nvSpPr>
+        <p:spPr>
+          <a:xfrm>
+            <a:off x="1975085" y="2241901"/>
+            <a:ext cx="988017" cy="215444"/>
+          </a:xfrm>
+          <a:prstGeom prst="rect">
+            <a:avLst/>
+          </a:prstGeom>
+          <a:noFill/>
+        </p:spPr>
+        <p:txBody>
+          <a:bodyPr wrap="square" rtlCol="0">
+            <a:spAutoFit/>
+          </a:bodyPr>
+          <a:lstStyle/>
+          <a:p>
+            <a:r>
+              <a:rPr lang="en-GB" sz="800" dirty="0">
+                <a:solidFill>
+                  <a:schemeClr val="bg1"/>
+                </a:solidFill>
+              </a:rPr>
+              <a:t>container</a:t>
+            </a:r>
+          </a:p>
+        </p:txBody>
+      </p:sp>
+      <p:sp>
+        <p:nvSpPr>
+          <p:cNvPr id="157" name="TextBox 156">
+            <a:extLst>
+              <a:ext uri="{FF2B5EF4-FFF2-40B4-BE49-F238E27FC236}">
+                <a16:creationId xmlns:a16="http://schemas.microsoft.com/office/drawing/2014/main" id="{32A0C214-FC90-1245-AB23-6D9DBECEB01A}"/>
+              </a:ext>
+            </a:extLst>
+          </p:cNvPr>
+          <p:cNvSpPr txBox="1"/>
+          <p:nvPr/>
+        </p:nvSpPr>
+        <p:spPr>
+          <a:xfrm>
+            <a:off x="1855133" y="4174178"/>
+            <a:ext cx="988017" cy="215444"/>
+          </a:xfrm>
+          <a:prstGeom prst="rect">
+            <a:avLst/>
+          </a:prstGeom>
+          <a:noFill/>
+        </p:spPr>
+        <p:txBody>
+          <a:bodyPr wrap="square" rtlCol="0">
+            <a:spAutoFit/>
+          </a:bodyPr>
+          <a:lstStyle/>
+          <a:p>
+            <a:r>
+              <a:rPr lang="en-GB" sz="800" dirty="0">
+                <a:solidFill>
+                  <a:schemeClr val="bg1"/>
+                </a:solidFill>
+              </a:rPr>
+              <a:t>container</a:t>
+            </a:r>
+          </a:p>
+        </p:txBody>
+      </p:sp>
+      <p:sp>
+        <p:nvSpPr>
+          <p:cNvPr id="159" name="TextBox 158">
+            <a:extLst>
+              <a:ext uri="{FF2B5EF4-FFF2-40B4-BE49-F238E27FC236}">
+                <a16:creationId xmlns:a16="http://schemas.microsoft.com/office/drawing/2014/main" id="{B5F3ABEA-EE88-454A-BDC9-B080575FA689}"/>
+              </a:ext>
+            </a:extLst>
+          </p:cNvPr>
+          <p:cNvSpPr txBox="1"/>
+          <p:nvPr/>
+        </p:nvSpPr>
+        <p:spPr>
+          <a:xfrm>
+            <a:off x="5118233" y="2246128"/>
+            <a:ext cx="988017" cy="215444"/>
+          </a:xfrm>
+          <a:prstGeom prst="rect">
+            <a:avLst/>
+          </a:prstGeom>
+          <a:noFill/>
+        </p:spPr>
+        <p:txBody>
+          <a:bodyPr wrap="square" rtlCol="0">
+            <a:spAutoFit/>
+          </a:bodyPr>
+          <a:lstStyle/>
+          <a:p>
+            <a:r>
+              <a:rPr lang="en-GB" sz="800" dirty="0">
+                <a:solidFill>
+                  <a:schemeClr val="bg1"/>
+                </a:solidFill>
+              </a:rPr>
+              <a:t>container</a:t>
+            </a:r>
+          </a:p>
+        </p:txBody>
+      </p:sp>
+      <p:sp>
+        <p:nvSpPr>
+          <p:cNvPr id="161" name="TextBox 160">
+            <a:extLst>
+              <a:ext uri="{FF2B5EF4-FFF2-40B4-BE49-F238E27FC236}">
+                <a16:creationId xmlns:a16="http://schemas.microsoft.com/office/drawing/2014/main" id="{0226C699-681F-094C-B4CC-94BCFC95446B}"/>
+              </a:ext>
+            </a:extLst>
+          </p:cNvPr>
+          <p:cNvSpPr txBox="1"/>
+          <p:nvPr/>
+        </p:nvSpPr>
+        <p:spPr>
+          <a:xfrm>
+            <a:off x="8012579" y="2215398"/>
+            <a:ext cx="988017" cy="215444"/>
+          </a:xfrm>
+          <a:prstGeom prst="rect">
+            <a:avLst/>
+          </a:prstGeom>
+          <a:noFill/>
+        </p:spPr>
+        <p:txBody>
+          <a:bodyPr wrap="square" rtlCol="0">
+            <a:spAutoFit/>
+          </a:bodyPr>
+          <a:lstStyle/>
+          <a:p>
+            <a:r>
+              <a:rPr lang="en-GB" sz="800" dirty="0">
+                <a:solidFill>
+                  <a:schemeClr val="bg1"/>
+                </a:solidFill>
+              </a:rPr>
+              <a:t>container</a:t>
+            </a:r>
+          </a:p>
+        </p:txBody>
+      </p:sp>
+      <p:sp>
+        <p:nvSpPr>
+          <p:cNvPr id="162" name="TextBox 161">
+            <a:extLst>
+              <a:ext uri="{FF2B5EF4-FFF2-40B4-BE49-F238E27FC236}">
+                <a16:creationId xmlns:a16="http://schemas.microsoft.com/office/drawing/2014/main" id="{C50B11DC-CA0D-A846-9390-D89C9154907B}"/>
+              </a:ext>
+            </a:extLst>
+          </p:cNvPr>
+          <p:cNvSpPr txBox="1"/>
+          <p:nvPr/>
+        </p:nvSpPr>
+        <p:spPr>
+          <a:xfrm>
+            <a:off x="7723223" y="4173350"/>
+            <a:ext cx="988017" cy="215444"/>
+          </a:xfrm>
+          <a:prstGeom prst="rect">
+            <a:avLst/>
+          </a:prstGeom>
+          <a:noFill/>
+        </p:spPr>
+        <p:txBody>
+          <a:bodyPr wrap="square" rtlCol="0">
+            <a:spAutoFit/>
+          </a:bodyPr>
+          <a:lstStyle/>
+          <a:p>
+            <a:r>
+              <a:rPr lang="en-GB" sz="800" dirty="0">
+                <a:solidFill>
+                  <a:schemeClr val="bg1"/>
+                </a:solidFill>
+              </a:rPr>
+              <a:t>container</a:t>
             </a:r>
           </a:p>
         </p:txBody>

</xml_diff>